<commit_message>
CV for Lab of Linh An
</commit_message>
<xml_diff>
--- a/_self/_for_studying/_lab_applying/_DCN_Lab_Soongsil_Univer_Aimed/_create/_cv_for_study_updated_for_CND.pptx
+++ b/_self/_for_studying/_lab_applying/_DCN_Lab_Soongsil_Univer_Aimed/_create/_cv_for_study_updated_for_CND.pptx
@@ -1173,7 +1173,7 @@
           </a:ln>
           <a:extLst>
             <a:ext uri="{C572A759-6A51-4108-AA02-DFA0A04FC94B}">
-              <ma14:wrappingTextBoxFlag xmlns:ma14="http://schemas.microsoft.com/office/mac/drawingml/2011/main" xmlns:a14="http://schemas.microsoft.com/office/drawing/2010/main" xmlns:m="http://schemas.openxmlformats.org/officeDocument/2006/math" xmlns="" val="1"/>
+              <ma14:wrappingTextBoxFlag xmlns="" xmlns:m="http://schemas.openxmlformats.org/officeDocument/2006/math" xmlns:a14="http://schemas.microsoft.com/office/drawing/2010/main" xmlns:ma14="http://schemas.microsoft.com/office/mac/drawingml/2011/main" val="1"/>
             </a:ext>
           </a:extLst>
         </p:spPr>
@@ -1520,7 +1520,7 @@
           </a:ln>
           <a:extLst>
             <a:ext uri="{C572A759-6A51-4108-AA02-DFA0A04FC94B}">
-              <ma14:wrappingTextBoxFlag xmlns:ma14="http://schemas.microsoft.com/office/mac/drawingml/2011/main" xmlns:a14="http://schemas.microsoft.com/office/drawing/2010/main" xmlns:m="http://schemas.openxmlformats.org/officeDocument/2006/math" xmlns="" val="1"/>
+              <ma14:wrappingTextBoxFlag xmlns="" xmlns:m="http://schemas.openxmlformats.org/officeDocument/2006/math" xmlns:a14="http://schemas.microsoft.com/office/drawing/2010/main" xmlns:ma14="http://schemas.microsoft.com/office/mac/drawingml/2011/main" val="1"/>
             </a:ext>
           </a:extLst>
         </p:spPr>
@@ -2529,10 +2529,10 @@
         </p:nvGrpSpPr>
         <p:grpSpPr>
           <a:xfrm>
-            <a:off x="2560318" y="6722758"/>
-            <a:ext cx="4163547" cy="993211"/>
+            <a:off x="2560318" y="6722754"/>
+            <a:ext cx="4163547" cy="993214"/>
             <a:chOff x="298349" y="6278034"/>
-            <a:chExt cx="2284839" cy="1075978"/>
+            <a:chExt cx="2284839" cy="1075982"/>
           </a:xfrm>
         </p:grpSpPr>
         <p:sp>
@@ -2560,7 +2560,7 @@
             </a:ln>
             <a:extLst>
               <a:ext uri="{C572A759-6A51-4108-AA02-DFA0A04FC94B}">
-                <ma14:wrappingTextBoxFlag xmlns:ma14="http://schemas.microsoft.com/office/mac/drawingml/2011/main" xmlns:a14="http://schemas.microsoft.com/office/drawing/2010/main" xmlns:m="http://schemas.openxmlformats.org/officeDocument/2006/math" xmlns="" val="1"/>
+                <ma14:wrappingTextBoxFlag xmlns="" xmlns:m="http://schemas.openxmlformats.org/officeDocument/2006/math" xmlns:a14="http://schemas.microsoft.com/office/drawing/2010/main" xmlns:ma14="http://schemas.microsoft.com/office/mac/drawingml/2011/main" val="1"/>
               </a:ext>
             </a:extLst>
           </p:spPr>
@@ -2633,8 +2633,8 @@
           </p:nvSpPr>
           <p:spPr>
             <a:xfrm>
-              <a:off x="298349" y="6617512"/>
-              <a:ext cx="2284839" cy="736500"/>
+              <a:off x="298349" y="6617515"/>
+              <a:ext cx="2284839" cy="736501"/>
             </a:xfrm>
             <a:prstGeom prst="rect">
               <a:avLst/>
@@ -2816,7 +2816,7 @@
             </a:ln>
             <a:extLst>
               <a:ext uri="{C572A759-6A51-4108-AA02-DFA0A04FC94B}">
-                <ma14:wrappingTextBoxFlag xmlns:ma14="http://schemas.microsoft.com/office/mac/drawingml/2011/main" xmlns:a14="http://schemas.microsoft.com/office/drawing/2010/main" xmlns:m="http://schemas.openxmlformats.org/officeDocument/2006/math" xmlns="" val="1"/>
+                <ma14:wrappingTextBoxFlag xmlns="" xmlns:m="http://schemas.openxmlformats.org/officeDocument/2006/math" xmlns:a14="http://schemas.microsoft.com/office/drawing/2010/main" xmlns:ma14="http://schemas.microsoft.com/office/mac/drawingml/2011/main" val="1"/>
               </a:ext>
             </a:extLst>
           </p:spPr>
@@ -2864,7 +2864,7 @@
             </a:ln>
             <a:extLst>
               <a:ext uri="{C572A759-6A51-4108-AA02-DFA0A04FC94B}">
-                <ma14:wrappingTextBoxFlag xmlns:ma14="http://schemas.microsoft.com/office/mac/drawingml/2011/main" xmlns:a14="http://schemas.microsoft.com/office/drawing/2010/main" xmlns:m="http://schemas.openxmlformats.org/officeDocument/2006/math" xmlns="" val="1"/>
+                <ma14:wrappingTextBoxFlag xmlns="" xmlns:m="http://schemas.openxmlformats.org/officeDocument/2006/math" xmlns:a14="http://schemas.microsoft.com/office/drawing/2010/main" xmlns:ma14="http://schemas.microsoft.com/office/mac/drawingml/2011/main" val="1"/>
               </a:ext>
             </a:extLst>
           </p:spPr>
@@ -2939,7 +2939,7 @@
             </a:ln>
             <a:extLst>
               <a:ext uri="{C572A759-6A51-4108-AA02-DFA0A04FC94B}">
-                <ma14:wrappingTextBoxFlag xmlns:ma14="http://schemas.microsoft.com/office/mac/drawingml/2011/main" xmlns:a14="http://schemas.microsoft.com/office/drawing/2010/main" xmlns:m="http://schemas.openxmlformats.org/officeDocument/2006/math" xmlns="" val="1"/>
+                <ma14:wrappingTextBoxFlag xmlns="" xmlns:m="http://schemas.openxmlformats.org/officeDocument/2006/math" xmlns:a14="http://schemas.microsoft.com/office/drawing/2010/main" xmlns:ma14="http://schemas.microsoft.com/office/mac/drawingml/2011/main" val="1"/>
               </a:ext>
             </a:extLst>
           </p:spPr>
@@ -2987,7 +2987,7 @@
             </a:ln>
             <a:extLst>
               <a:ext uri="{C572A759-6A51-4108-AA02-DFA0A04FC94B}">
-                <ma14:wrappingTextBoxFlag xmlns:ma14="http://schemas.microsoft.com/office/mac/drawingml/2011/main" xmlns:a14="http://schemas.microsoft.com/office/drawing/2010/main" xmlns:m="http://schemas.openxmlformats.org/officeDocument/2006/math" xmlns="" val="1"/>
+                <ma14:wrappingTextBoxFlag xmlns="" xmlns:m="http://schemas.openxmlformats.org/officeDocument/2006/math" xmlns:a14="http://schemas.microsoft.com/office/drawing/2010/main" xmlns:ma14="http://schemas.microsoft.com/office/mac/drawingml/2011/main" val="1"/>
               </a:ext>
             </a:extLst>
           </p:spPr>
@@ -3863,7 +3863,7 @@
             </a:ln>
             <a:extLst>
               <a:ext uri="{C572A759-6A51-4108-AA02-DFA0A04FC94B}">
-                <ma14:wrappingTextBoxFlag xmlns:ma14="http://schemas.microsoft.com/office/mac/drawingml/2011/main" xmlns:a14="http://schemas.microsoft.com/office/drawing/2010/main" xmlns:m="http://schemas.openxmlformats.org/officeDocument/2006/math" xmlns="" val="1"/>
+                <ma14:wrappingTextBoxFlag xmlns="" xmlns:m="http://schemas.openxmlformats.org/officeDocument/2006/math" xmlns:a14="http://schemas.microsoft.com/office/drawing/2010/main" xmlns:ma14="http://schemas.microsoft.com/office/mac/drawingml/2011/main" val="1"/>
               </a:ext>
             </a:extLst>
           </p:spPr>
@@ -4237,7 +4237,7 @@
             </a:ln>
             <a:extLst>
               <a:ext uri="{C572A759-6A51-4108-AA02-DFA0A04FC94B}">
-                <ma14:wrappingTextBoxFlag xmlns:ma14="http://schemas.microsoft.com/office/mac/drawingml/2011/main" xmlns:a14="http://schemas.microsoft.com/office/drawing/2010/main" xmlns:m="http://schemas.openxmlformats.org/officeDocument/2006/math" xmlns="" val="1"/>
+                <ma14:wrappingTextBoxFlag xmlns="" xmlns:m="http://schemas.openxmlformats.org/officeDocument/2006/math" xmlns:a14="http://schemas.microsoft.com/office/drawing/2010/main" xmlns:ma14="http://schemas.microsoft.com/office/mac/drawingml/2011/main" val="1"/>
               </a:ext>
             </a:extLst>
           </p:spPr>
@@ -4817,7 +4817,7 @@
             </a:ln>
             <a:extLst>
               <a:ext uri="{C572A759-6A51-4108-AA02-DFA0A04FC94B}">
-                <ma14:wrappingTextBoxFlag xmlns:ma14="http://schemas.microsoft.com/office/mac/drawingml/2011/main" xmlns:a14="http://schemas.microsoft.com/office/drawing/2010/main" xmlns:m="http://schemas.openxmlformats.org/officeDocument/2006/math" xmlns="" val="1"/>
+                <ma14:wrappingTextBoxFlag xmlns="" xmlns:m="http://schemas.openxmlformats.org/officeDocument/2006/math" xmlns:a14="http://schemas.microsoft.com/office/drawing/2010/main" xmlns:ma14="http://schemas.microsoft.com/office/mac/drawingml/2011/main" val="1"/>
               </a:ext>
             </a:extLst>
           </p:spPr>
@@ -5432,7 +5432,7 @@
             </a:ln>
             <a:extLst>
               <a:ext uri="{C572A759-6A51-4108-AA02-DFA0A04FC94B}">
-                <ma14:wrappingTextBoxFlag xmlns:ma14="http://schemas.microsoft.com/office/mac/drawingml/2011/main" xmlns:a14="http://schemas.microsoft.com/office/drawing/2010/main" xmlns:m="http://schemas.openxmlformats.org/officeDocument/2006/math" xmlns="" val="1"/>
+                <ma14:wrappingTextBoxFlag xmlns="" xmlns:m="http://schemas.openxmlformats.org/officeDocument/2006/math" xmlns:a14="http://schemas.microsoft.com/office/drawing/2010/main" xmlns:ma14="http://schemas.microsoft.com/office/mac/drawingml/2011/main" val="1"/>
               </a:ext>
             </a:extLst>
           </p:spPr>
@@ -5704,7 +5704,7 @@
               </a:ln>
               <a:extLst>
                 <a:ext uri="{C572A759-6A51-4108-AA02-DFA0A04FC94B}">
-                  <ma14:wrappingTextBoxFlag xmlns:ma14="http://schemas.microsoft.com/office/mac/drawingml/2011/main" xmlns:a14="http://schemas.microsoft.com/office/drawing/2010/main" xmlns:m="http://schemas.openxmlformats.org/officeDocument/2006/math" xmlns="" val="1"/>
+                  <ma14:wrappingTextBoxFlag xmlns="" xmlns:m="http://schemas.openxmlformats.org/officeDocument/2006/math" xmlns:a14="http://schemas.microsoft.com/office/drawing/2010/main" xmlns:ma14="http://schemas.microsoft.com/office/mac/drawingml/2011/main" val="1"/>
                 </a:ext>
               </a:extLst>
             </p:spPr>
@@ -5810,7 +5810,7 @@
             </a:ln>
             <a:extLst>
               <a:ext uri="{C572A759-6A51-4108-AA02-DFA0A04FC94B}">
-                <ma14:wrappingTextBoxFlag xmlns:ma14="http://schemas.microsoft.com/office/mac/drawingml/2011/main" xmlns:a14="http://schemas.microsoft.com/office/drawing/2010/main" xmlns:m="http://schemas.openxmlformats.org/officeDocument/2006/math" xmlns="" val="1"/>
+                <ma14:wrappingTextBoxFlag xmlns="" xmlns:m="http://schemas.openxmlformats.org/officeDocument/2006/math" xmlns:a14="http://schemas.microsoft.com/office/drawing/2010/main" xmlns:ma14="http://schemas.microsoft.com/office/mac/drawingml/2011/main" val="1"/>
               </a:ext>
             </a:extLst>
           </p:spPr>
@@ -6056,9 +6056,9 @@
         <p:grpSpPr>
           <a:xfrm>
             <a:off x="123815" y="7030720"/>
-            <a:ext cx="2286000" cy="960499"/>
+            <a:ext cx="2286145" cy="1230119"/>
             <a:chOff x="123815" y="5667273"/>
-            <a:chExt cx="2286000" cy="960499"/>
+            <a:chExt cx="2286145" cy="1230119"/>
           </a:xfrm>
         </p:grpSpPr>
         <p:sp>
@@ -6086,7 +6086,7 @@
             </a:ln>
             <a:extLst>
               <a:ext uri="{C572A759-6A51-4108-AA02-DFA0A04FC94B}">
-                <ma14:wrappingTextBoxFlag xmlns:ma14="http://schemas.microsoft.com/office/mac/drawingml/2011/main" xmlns:a14="http://schemas.microsoft.com/office/drawing/2010/main" xmlns:m="http://schemas.openxmlformats.org/officeDocument/2006/math" xmlns="" val="1"/>
+                <ma14:wrappingTextBoxFlag xmlns="" xmlns:m="http://schemas.openxmlformats.org/officeDocument/2006/math" xmlns:a14="http://schemas.microsoft.com/office/drawing/2010/main" xmlns:ma14="http://schemas.microsoft.com/office/mac/drawingml/2011/main" val="1"/>
               </a:ext>
             </a:extLst>
           </p:spPr>
@@ -6159,8 +6159,8 @@
           </p:nvSpPr>
           <p:spPr>
             <a:xfrm>
-              <a:off x="123815" y="5947927"/>
-              <a:ext cx="2286000" cy="679845"/>
+              <a:off x="123960" y="6009798"/>
+              <a:ext cx="2286000" cy="887594"/>
             </a:xfrm>
             <a:prstGeom prst="rect">
               <a:avLst/>
@@ -6203,7 +6203,7 @@
                 <a:buChar char="•"/>
               </a:pPr>
               <a:r>
-                <a:rPr lang="en-US" sz="900" b="0" dirty="0">
+                <a:rPr lang="pt-BR" sz="900" b="0" dirty="0">
                   <a:solidFill>
                     <a:schemeClr val="tx1"/>
                   </a:solidFill>
@@ -6212,10 +6212,19 @@
                   <a:cs typeface="Arial" panose="020B0604020202020204" pitchFamily="34" charset="0"/>
                   <a:sym typeface="Helvetica Neue Medium"/>
                 </a:rPr>
-                <a:t>The Networking Course CCNA (David </a:t>
-              </a:r>
-              <a:r>
-                <a:rPr lang="en-US" sz="900" b="0" dirty="0" err="1">
+                <a:t>Microsoft Azure Fundamentals (Udemy)</a:t>
+              </a:r>
+            </a:p>
+            <a:p>
+              <a:pPr marL="171450" indent="-171450" algn="l" defTabSz="556127">
+                <a:lnSpc>
+                  <a:spcPct val="150000"/>
+                </a:lnSpc>
+                <a:buFont typeface="Arial" panose="020B0604020202020204" pitchFamily="34" charset="0"/>
+                <a:buChar char="•"/>
+              </a:pPr>
+              <a:r>
+                <a:rPr lang="pt-BR" sz="900" b="0" dirty="0">
                   <a:solidFill>
                     <a:schemeClr val="tx1"/>
                   </a:solidFill>
@@ -6224,20 +6233,26 @@
                   <a:cs typeface="Arial" panose="020B0604020202020204" pitchFamily="34" charset="0"/>
                   <a:sym typeface="Helvetica Neue Medium"/>
                 </a:rPr>
-                <a:t>Bombal</a:t>
-              </a:r>
-              <a:r>
-                <a:rPr lang="en-US" sz="900" b="0" dirty="0">
-                  <a:solidFill>
-                    <a:schemeClr val="tx1"/>
-                  </a:solidFill>
-                  <a:latin typeface="Arial" panose="020B0604020202020204" pitchFamily="34" charset="0"/>
-                  <a:ea typeface="Calibri" panose="020F0502020204030204" pitchFamily="34" charset="0"/>
-                  <a:cs typeface="Arial" panose="020B0604020202020204" pitchFamily="34" charset="0"/>
-                  <a:sym typeface="Helvetica Neue Medium"/>
-                </a:rPr>
-                <a:t>) </a:t>
-              </a:r>
+                <a:t>Kubernetes (Udemy)</a:t>
+              </a:r>
+            </a:p>
+            <a:p>
+              <a:pPr marL="171450" indent="-171450" algn="l" defTabSz="556127">
+                <a:lnSpc>
+                  <a:spcPct val="150000"/>
+                </a:lnSpc>
+                <a:buFont typeface="Arial" panose="020B0604020202020204" pitchFamily="34" charset="0"/>
+                <a:buChar char="•"/>
+              </a:pPr>
+              <a:endParaRPr lang="en-US" sz="900" b="0" dirty="0">
+                <a:solidFill>
+                  <a:schemeClr val="tx1"/>
+                </a:solidFill>
+                <a:latin typeface="Arial" panose="020B0604020202020204" pitchFamily="34" charset="0"/>
+                <a:ea typeface="Calibri" panose="020F0502020204030204" pitchFamily="34" charset="0"/>
+                <a:cs typeface="Arial" panose="020B0604020202020204" pitchFamily="34" charset="0"/>
+                <a:sym typeface="Helvetica Neue Medium"/>
+              </a:endParaRPr>
             </a:p>
             <a:p>
               <a:pPr marL="171450" indent="-171450" algn="l" defTabSz="556127">

</xml_diff>